<commit_message>
figs width adjustment, platex twice
</commit_message>
<xml_diff>
--- a/MapofEigenvalues.pptx
+++ b/MapofEigenvalues.pptx
@@ -211,7 +211,7 @@
           <a:p>
             <a:fld id="{B48BDBE6-3B77-FA42-B401-992CB5C9A3FB}" type="datetimeFigureOut">
               <a:rPr kumimoji="1" lang="ja-JP" altLang="en-US" smtClean="0"/>
-              <a:t>2023/3/23</a:t>
+              <a:t>2023/8/22</a:t>
             </a:fld>
             <a:endParaRPr kumimoji="1" lang="ja-JP" altLang="en-US"/>
           </a:p>
@@ -641,7 +641,7 @@
           <a:p>
             <a:fld id="{D2DE5DB0-24ED-0647-A0FF-641EC2D8D3C0}" type="datetime1">
               <a:rPr kumimoji="1" lang="ja-JP" altLang="en-US" smtClean="0"/>
-              <a:t>2023/3/23</a:t>
+              <a:t>2023/8/22</a:t>
             </a:fld>
             <a:endParaRPr kumimoji="1" lang="ja-JP" altLang="en-US"/>
           </a:p>
@@ -851,7 +851,7 @@
           <a:p>
             <a:fld id="{4FEB9B3B-4728-2147-8605-7DEB1062D5F3}" type="datetime1">
               <a:rPr kumimoji="1" lang="ja-JP" altLang="en-US" smtClean="0"/>
-              <a:t>2023/3/23</a:t>
+              <a:t>2023/8/22</a:t>
             </a:fld>
             <a:endParaRPr kumimoji="1" lang="ja-JP" altLang="en-US"/>
           </a:p>
@@ -1071,7 +1071,7 @@
           <a:p>
             <a:fld id="{D822A63C-F9EF-5B49-9281-1FD6DE739325}" type="datetime1">
               <a:rPr kumimoji="1" lang="ja-JP" altLang="en-US" smtClean="0"/>
-              <a:t>2023/3/23</a:t>
+              <a:t>2023/8/22</a:t>
             </a:fld>
             <a:endParaRPr kumimoji="1" lang="ja-JP" altLang="en-US"/>
           </a:p>
@@ -1281,7 +1281,7 @@
           <a:p>
             <a:fld id="{2A7241EB-A652-2245-878D-D599B2AA2DE1}" type="datetime1">
               <a:rPr kumimoji="1" lang="ja-JP" altLang="en-US" smtClean="0"/>
-              <a:t>2023/3/23</a:t>
+              <a:t>2023/8/22</a:t>
             </a:fld>
             <a:endParaRPr kumimoji="1" lang="ja-JP" altLang="en-US"/>
           </a:p>
@@ -1535,7 +1535,7 @@
           <a:p>
             <a:fld id="{CAB2BECD-D4D7-A04B-8B2E-7821E46C292D}" type="datetime1">
               <a:rPr kumimoji="1" lang="ja-JP" altLang="en-US" smtClean="0"/>
-              <a:t>2023/3/23</a:t>
+              <a:t>2023/8/22</a:t>
             </a:fld>
             <a:endParaRPr kumimoji="1" lang="ja-JP" altLang="en-US"/>
           </a:p>
@@ -1839,7 +1839,7 @@
           <a:p>
             <a:fld id="{C2C4245E-8A7B-FE48-AD8A-240D35F3CE47}" type="datetime1">
               <a:rPr kumimoji="1" lang="ja-JP" altLang="en-US" smtClean="0"/>
-              <a:t>2023/3/23</a:t>
+              <a:t>2023/8/22</a:t>
             </a:fld>
             <a:endParaRPr kumimoji="1" lang="ja-JP" altLang="en-US"/>
           </a:p>
@@ -2278,7 +2278,7 @@
           <a:p>
             <a:fld id="{9CBE2ADF-6037-A84F-BB5D-173A75F7B3B9}" type="datetime1">
               <a:rPr kumimoji="1" lang="ja-JP" altLang="en-US" smtClean="0"/>
-              <a:t>2023/3/23</a:t>
+              <a:t>2023/8/22</a:t>
             </a:fld>
             <a:endParaRPr kumimoji="1" lang="ja-JP" altLang="en-US"/>
           </a:p>
@@ -2404,7 +2404,7 @@
           <a:p>
             <a:fld id="{9F54DA4F-6209-E24F-85D9-F1F0FD5E9DB3}" type="datetime1">
               <a:rPr kumimoji="1" lang="ja-JP" altLang="en-US" smtClean="0"/>
-              <a:t>2023/3/23</a:t>
+              <a:t>2023/8/22</a:t>
             </a:fld>
             <a:endParaRPr kumimoji="1" lang="ja-JP" altLang="en-US"/>
           </a:p>
@@ -2507,7 +2507,7 @@
           <a:p>
             <a:fld id="{AFAB5A62-A7F2-4749-89AB-14E750C5D0B3}" type="datetime1">
               <a:rPr kumimoji="1" lang="ja-JP" altLang="en-US" smtClean="0"/>
-              <a:t>2023/3/23</a:t>
+              <a:t>2023/8/22</a:t>
             </a:fld>
             <a:endParaRPr kumimoji="1" lang="ja-JP" altLang="en-US"/>
           </a:p>
@@ -2824,7 +2824,7 @@
           <a:p>
             <a:fld id="{6AAF3263-1978-F342-899D-E282F8646536}" type="datetime1">
               <a:rPr kumimoji="1" lang="ja-JP" altLang="en-US" smtClean="0"/>
-              <a:t>2023/3/23</a:t>
+              <a:t>2023/8/22</a:t>
             </a:fld>
             <a:endParaRPr kumimoji="1" lang="ja-JP" altLang="en-US"/>
           </a:p>
@@ -3089,7 +3089,7 @@
           <a:p>
             <a:fld id="{4B419A92-5141-7249-9135-7D8E0F076278}" type="datetime1">
               <a:rPr kumimoji="1" lang="ja-JP" altLang="en-US" smtClean="0"/>
-              <a:t>2023/3/23</a:t>
+              <a:t>2023/8/22</a:t>
             </a:fld>
             <a:endParaRPr kumimoji="1" lang="ja-JP" altLang="en-US"/>
           </a:p>
@@ -3345,7 +3345,7 @@
             <a:fld id="{BC290475-D272-2848-83E8-BEB25ED3C463}" type="datetime1">
               <a:rPr kumimoji="1" lang="ja-JP" altLang="en-US" smtClean="0"/>
               <a:pPr/>
-              <a:t>2023/3/23</a:t>
+              <a:t>2023/8/22</a:t>
             </a:fld>
             <a:endParaRPr kumimoji="1" lang="ja-JP" altLang="en-US"/>
           </a:p>
@@ -6392,7 +6392,7 @@
               </a:prstGeom>
               <a:solidFill>
                 <a:schemeClr val="accent2">
-                  <a:alpha val="28851"/>
+                  <a:alpha val="50000"/>
                 </a:schemeClr>
               </a:solidFill>
               <a:ln>
@@ -7116,7 +7116,7 @@
               </a:prstGeom>
               <a:solidFill>
                 <a:schemeClr val="accent2">
-                  <a:alpha val="29000"/>
+                  <a:alpha val="50196"/>
                 </a:schemeClr>
               </a:solidFill>
               <a:ln>
@@ -8988,7 +8988,7 @@
             </a:prstGeom>
             <a:solidFill>
               <a:schemeClr val="accent2">
-                <a:alpha val="28560"/>
+                <a:alpha val="50000"/>
               </a:schemeClr>
             </a:solidFill>
             <a:ln>
@@ -9886,7 +9886,7 @@
             </a:prstGeom>
             <a:solidFill>
               <a:schemeClr val="accent2">
-                <a:alpha val="28560"/>
+                <a:alpha val="50000"/>
               </a:schemeClr>
             </a:solidFill>
             <a:ln>
@@ -10750,7 +10750,7 @@
             </a:prstGeom>
             <a:solidFill>
               <a:schemeClr val="accent2">
-                <a:alpha val="29000"/>
+                <a:alpha val="50000"/>
               </a:schemeClr>
             </a:solidFill>
             <a:ln w="66675">
@@ -11796,7 +11796,7 @@
             <a:ln w="66675">
               <a:solidFill>
                 <a:schemeClr val="accent2">
-                  <a:alpha val="29000"/>
+                  <a:alpha val="50070"/>
                 </a:schemeClr>
               </a:solidFill>
               <a:tailEnd type="triangle"/>
@@ -13606,7 +13606,7 @@
               </a:prstGeom>
               <a:solidFill>
                 <a:schemeClr val="accent2">
-                  <a:alpha val="29000"/>
+                  <a:alpha val="50000"/>
                 </a:schemeClr>
               </a:solidFill>
               <a:ln>

</xml_diff>